<commit_message>
sorry sarah, changed your changes again ^^
</commit_message>
<xml_diff>
--- a/doc/PPT-2013-05-22/Kick-Off-Präsi.pptx
+++ b/doc/PPT-2013-05-22/Kick-Off-Präsi.pptx
@@ -7,10 +7,10 @@
     <p:sldMasterId id="2147483672" r:id="rId3"/>
   </p:sldMasterIdLst>
   <p:notesMasterIdLst>
-    <p:notesMasterId r:id="rId10"/>
+    <p:notesMasterId r:id="rId12"/>
   </p:notesMasterIdLst>
   <p:handoutMasterIdLst>
-    <p:handoutMasterId r:id="rId11"/>
+    <p:handoutMasterId r:id="rId13"/>
   </p:handoutMasterIdLst>
   <p:sldIdLst>
     <p:sldId id="256" r:id="rId4"/>
@@ -18,7 +18,9 @@
     <p:sldId id="259" r:id="rId6"/>
     <p:sldId id="260" r:id="rId7"/>
     <p:sldId id="261" r:id="rId8"/>
-    <p:sldId id="262" r:id="rId9"/>
+    <p:sldId id="264" r:id="rId9"/>
+    <p:sldId id="263" r:id="rId10"/>
+    <p:sldId id="262" r:id="rId11"/>
   </p:sldIdLst>
   <p:sldSz cx="9144000" cy="6858000" type="screen4x3"/>
   <p:notesSz cx="6858000" cy="9144000"/>
@@ -512,6 +514,11 @@
         </p:txBody>
       </p:sp>
     </p:spTree>
+    <p:extLst>
+      <p:ext uri="{BB962C8B-B14F-4D97-AF65-F5344CB8AC3E}">
+        <p14:creationId xmlns:p14="http://schemas.microsoft.com/office/powerpoint/2010/main" val="3567494768"/>
+      </p:ext>
+    </p:extLst>
   </p:cSld>
   <p:clrMap bg1="lt1" tx1="dk1" bg2="lt2" tx2="dk2" accent1="accent1" accent2="accent2" accent3="accent3" accent4="accent4" accent5="accent5" accent6="accent6" hlink="hlink" folHlink="folHlink"/>
 </p:handoutMaster>
@@ -769,6 +776,11 @@
         </p:txBody>
       </p:sp>
     </p:spTree>
+    <p:extLst>
+      <p:ext uri="{BB962C8B-B14F-4D97-AF65-F5344CB8AC3E}">
+        <p14:creationId xmlns:p14="http://schemas.microsoft.com/office/powerpoint/2010/main" val="537048004"/>
+      </p:ext>
+    </p:extLst>
   </p:cSld>
   <p:clrMap bg1="lt1" tx1="dk1" bg2="lt2" tx2="dk2" accent1="accent1" accent2="accent2" accent3="accent3" accent4="accent4" accent5="accent5" accent6="accent6" hlink="hlink" folHlink="folHlink"/>
   <p:notesStyle>
@@ -1347,8 +1359,8 @@
         </p:nvSpPr>
         <p:spPr>
           <a:xfrm>
-            <a:off x="1143000" y="694800"/>
-            <a:ext cx="4571640" cy="3428639"/>
+            <a:off x="1144588" y="695325"/>
+            <a:ext cx="4568825" cy="3427413"/>
           </a:xfrm>
           <a:solidFill>
             <a:srgbClr val="CFE7F5"/>
@@ -1432,10 +1444,236 @@
           <a:lstStyle/>
           <a:p>
             <a:pPr lvl="0" algn="l" hangingPunct="1"/>
+            <a:fld id="{DF686C62-0B99-438D-A8A1-15330990C596}" type="slidenum">
+              <a:rPr/>
+              <a:pPr lvl="0" algn="l" hangingPunct="1"/>
+              <a:t>6</a:t>
+            </a:fld>
+            <a:endParaRPr lang="de-DE" sz="1800">
+              <a:solidFill>
+                <a:srgbClr val="000000"/>
+              </a:solidFill>
+              <a:latin typeface="+mn-lt" pitchFamily="18"/>
+              <a:ea typeface="+mn-ea" pitchFamily="2"/>
+              <a:cs typeface="+mn-cs" pitchFamily="2"/>
+            </a:endParaRPr>
+          </a:p>
+        </p:txBody>
+      </p:sp>
+      <p:sp>
+        <p:nvSpPr>
+          <p:cNvPr id="2" name="Folienbildplatzhalter 1"/>
+          <p:cNvSpPr>
+            <a:spLocks noGrp="1" noRot="1" noChangeAspect="1" noResize="1"/>
+          </p:cNvSpPr>
+          <p:nvPr>
+            <p:ph type="sldImg"/>
+          </p:nvPr>
+        </p:nvSpPr>
+        <p:spPr>
+          <a:xfrm>
+            <a:off x="1144588" y="695325"/>
+            <a:ext cx="4568825" cy="3427413"/>
+          </a:xfrm>
+          <a:solidFill>
+            <a:srgbClr val="CFE7F5"/>
+          </a:solidFill>
+          <a:ln w="25400">
+            <a:solidFill>
+              <a:srgbClr val="808080"/>
+            </a:solidFill>
+            <a:prstDash val="solid"/>
+          </a:ln>
+        </p:spPr>
+      </p:sp>
+      <p:sp>
+        <p:nvSpPr>
+          <p:cNvPr id="3" name="Notizenplatzhalter 2"/>
+          <p:cNvSpPr txBox="1">
+            <a:spLocks noGrp="1"/>
+          </p:cNvSpPr>
+          <p:nvPr>
+            <p:ph type="body" sz="quarter" idx="1"/>
+          </p:nvPr>
+        </p:nvSpPr>
+        <p:spPr>
+          <a:xfrm>
+            <a:off x="685799" y="4343400"/>
+            <a:ext cx="5486040" cy="4114440"/>
+          </a:xfrm>
+        </p:spPr>
+        <p:txBody>
+          <a:bodyPr wrap="square" lIns="90000" tIns="45000" rIns="90000" bIns="45000" anchor="t"/>
+          <a:lstStyle/>
+          <a:p>
+            <a:pPr lvl="0"/>
+            <a:endParaRPr lang="de-DE"/>
+          </a:p>
+        </p:txBody>
+      </p:sp>
+    </p:spTree>
+  </p:cSld>
+  <p:clrMapOvr>
+    <a:masterClrMapping/>
+  </p:clrMapOvr>
+</p:notes>
+</file>
+
+<file path=ppt/notesSlides/notesSlide7.xml><?xml version="1.0" encoding="utf-8"?>
+<p:notes xmlns:a="http://schemas.openxmlformats.org/drawingml/2006/main" xmlns:r="http://schemas.openxmlformats.org/officeDocument/2006/relationships" xmlns:p="http://schemas.openxmlformats.org/presentationml/2006/main">
+  <p:cSld>
+    <p:spTree>
+      <p:nvGrpSpPr>
+        <p:cNvPr id="1" name=""/>
+        <p:cNvGrpSpPr/>
+        <p:nvPr/>
+      </p:nvGrpSpPr>
+      <p:grpSpPr>
+        <a:xfrm>
+          <a:off x="0" y="0"/>
+          <a:ext cx="0" cy="0"/>
+          <a:chOff x="0" y="0"/>
+          <a:chExt cx="0" cy="0"/>
+        </a:xfrm>
+      </p:grpSpPr>
+      <p:sp>
+        <p:nvSpPr>
+          <p:cNvPr id="4" name="Foliennummernplatzhalter 3"/>
+          <p:cNvSpPr txBox="1">
+            <a:spLocks noGrp="1"/>
+          </p:cNvSpPr>
+          <p:nvPr>
+            <p:ph type="sldNum" sz="quarter" idx="8"/>
+          </p:nvPr>
+        </p:nvSpPr>
+        <p:spPr>
+          <a:xfrm>
+            <a:off x="0" y="0"/>
+            <a:ext cx="360" cy="360"/>
+          </a:xfrm>
+        </p:spPr>
+        <p:txBody>
+          <a:bodyPr wrap="square" lIns="90000" tIns="45000" rIns="90000" bIns="45000" anchor="t"/>
+          <a:lstStyle/>
+          <a:p>
+            <a:pPr lvl="0" algn="l" hangingPunct="1"/>
+            <a:fld id="{DF686C62-0B99-438D-A8A1-15330990C596}" type="slidenum">
+              <a:rPr/>
+              <a:pPr lvl="0" algn="l" hangingPunct="1"/>
+              <a:t>7</a:t>
+            </a:fld>
+            <a:endParaRPr lang="de-DE" sz="1800">
+              <a:solidFill>
+                <a:srgbClr val="000000"/>
+              </a:solidFill>
+              <a:latin typeface="+mn-lt" pitchFamily="18"/>
+              <a:ea typeface="+mn-ea" pitchFamily="2"/>
+              <a:cs typeface="+mn-cs" pitchFamily="2"/>
+            </a:endParaRPr>
+          </a:p>
+        </p:txBody>
+      </p:sp>
+      <p:sp>
+        <p:nvSpPr>
+          <p:cNvPr id="2" name="Folienbildplatzhalter 1"/>
+          <p:cNvSpPr>
+            <a:spLocks noGrp="1" noRot="1" noChangeAspect="1" noResize="1"/>
+          </p:cNvSpPr>
+          <p:nvPr>
+            <p:ph type="sldImg"/>
+          </p:nvPr>
+        </p:nvSpPr>
+        <p:spPr>
+          <a:xfrm>
+            <a:off x="1144588" y="695325"/>
+            <a:ext cx="4568825" cy="3427413"/>
+          </a:xfrm>
+          <a:solidFill>
+            <a:srgbClr val="CFE7F5"/>
+          </a:solidFill>
+          <a:ln w="25400">
+            <a:solidFill>
+              <a:srgbClr val="808080"/>
+            </a:solidFill>
+            <a:prstDash val="solid"/>
+          </a:ln>
+        </p:spPr>
+      </p:sp>
+      <p:sp>
+        <p:nvSpPr>
+          <p:cNvPr id="3" name="Notizenplatzhalter 2"/>
+          <p:cNvSpPr txBox="1">
+            <a:spLocks noGrp="1"/>
+          </p:cNvSpPr>
+          <p:nvPr>
+            <p:ph type="body" sz="quarter" idx="1"/>
+          </p:nvPr>
+        </p:nvSpPr>
+        <p:spPr>
+          <a:xfrm>
+            <a:off x="685799" y="4343400"/>
+            <a:ext cx="5486040" cy="4114440"/>
+          </a:xfrm>
+        </p:spPr>
+        <p:txBody>
+          <a:bodyPr wrap="square" lIns="90000" tIns="45000" rIns="90000" bIns="45000" anchor="t"/>
+          <a:lstStyle/>
+          <a:p>
+            <a:pPr lvl="0"/>
+            <a:endParaRPr lang="de-DE"/>
+          </a:p>
+        </p:txBody>
+      </p:sp>
+    </p:spTree>
+  </p:cSld>
+  <p:clrMapOvr>
+    <a:masterClrMapping/>
+  </p:clrMapOvr>
+</p:notes>
+</file>
+
+<file path=ppt/notesSlides/notesSlide8.xml><?xml version="1.0" encoding="utf-8"?>
+<p:notes xmlns:a="http://schemas.openxmlformats.org/drawingml/2006/main" xmlns:r="http://schemas.openxmlformats.org/officeDocument/2006/relationships" xmlns:p="http://schemas.openxmlformats.org/presentationml/2006/main">
+  <p:cSld>
+    <p:spTree>
+      <p:nvGrpSpPr>
+        <p:cNvPr id="1" name=""/>
+        <p:cNvGrpSpPr/>
+        <p:nvPr/>
+      </p:nvGrpSpPr>
+      <p:grpSpPr>
+        <a:xfrm>
+          <a:off x="0" y="0"/>
+          <a:ext cx="0" cy="0"/>
+          <a:chOff x="0" y="0"/>
+          <a:chExt cx="0" cy="0"/>
+        </a:xfrm>
+      </p:grpSpPr>
+      <p:sp>
+        <p:nvSpPr>
+          <p:cNvPr id="4" name="Foliennummernplatzhalter 3"/>
+          <p:cNvSpPr txBox="1">
+            <a:spLocks noGrp="1"/>
+          </p:cNvSpPr>
+          <p:nvPr>
+            <p:ph type="sldNum" sz="quarter" idx="8"/>
+          </p:nvPr>
+        </p:nvSpPr>
+        <p:spPr>
+          <a:xfrm>
+            <a:off x="0" y="0"/>
+            <a:ext cx="360" cy="360"/>
+          </a:xfrm>
+        </p:spPr>
+        <p:txBody>
+          <a:bodyPr wrap="square" lIns="90000" tIns="45000" rIns="90000" bIns="45000" anchor="t"/>
+          <a:lstStyle/>
+          <a:p>
+            <a:pPr lvl="0" algn="l" hangingPunct="1"/>
             <a:fld id="{70269B52-2420-4C93-90B1-77A35557FB15}" type="slidenum">
               <a:rPr/>
               <a:pPr lvl="0" algn="l" hangingPunct="1"/>
-              <a:t>6</a:t>
+              <a:t>8</a:t>
             </a:fld>
             <a:endParaRPr lang="de-DE" sz="1800">
               <a:solidFill>
@@ -10691,7 +10929,7 @@
               <a:buNone/>
             </a:pPr>
             <a:r>
-              <a:rPr lang="de-DE" sz="4600" b="1">
+              <a:rPr lang="de-DE" sz="4600" b="1" dirty="0">
                 <a:effectLst>
                   <a:outerShdw dist="17961" dir="2700000">
                     <a:scrgbClr r="0" g="0" b="0"/>
@@ -10703,37 +10941,51 @@
               <a:t>Project Samael</a:t>
             </a:r>
             <a:r>
-              <a:rPr lang="de-DE" sz="3200" b="1">
+              <a:rPr lang="de-DE" sz="3200" b="1" dirty="0">
                 <a:latin typeface="Lucida Sans Unicode" pitchFamily="34"/>
                 <a:cs typeface="Lucida Sans Unicode" pitchFamily="34"/>
               </a:rPr>
               <a:t/>
             </a:r>
             <a:br>
-              <a:rPr lang="de-DE" sz="3200" b="1">
+              <a:rPr lang="de-DE" sz="3200" b="1" dirty="0">
                 <a:latin typeface="Lucida Sans Unicode" pitchFamily="34"/>
                 <a:cs typeface="Lucida Sans Unicode" pitchFamily="34"/>
               </a:rPr>
             </a:br>
             <a:r>
-              <a:rPr lang="de-DE" sz="3200" b="1">
+              <a:rPr lang="de-DE" sz="3200" b="1" dirty="0">
                 <a:latin typeface="Lucida Sans Unicode" pitchFamily="34"/>
                 <a:cs typeface="Lucida Sans Unicode" pitchFamily="34"/>
               </a:rPr>
               <a:t/>
             </a:r>
             <a:br>
-              <a:rPr lang="de-DE" sz="3200" b="1">
+              <a:rPr lang="de-DE" sz="3200" b="1" dirty="0">
                 <a:latin typeface="Lucida Sans Unicode" pitchFamily="34"/>
                 <a:cs typeface="Lucida Sans Unicode" pitchFamily="34"/>
               </a:rPr>
             </a:br>
             <a:r>
-              <a:rPr lang="de-DE" sz="2600" b="1">
+              <a:rPr lang="de-DE" sz="2600" b="1" dirty="0">
                 <a:latin typeface="Lucida Sans Unicode" pitchFamily="34"/>
                 <a:cs typeface="Lucida Sans Unicode" pitchFamily="34"/>
               </a:rPr>
-              <a:t>- “The Blind God“ -</a:t>
+              <a:t>- “The Blind </a:t>
+            </a:r>
+            <a:r>
+              <a:rPr lang="de-DE" sz="2600" b="1" dirty="0" err="1">
+                <a:latin typeface="Lucida Sans Unicode" pitchFamily="34"/>
+                <a:cs typeface="Lucida Sans Unicode" pitchFamily="34"/>
+              </a:rPr>
+              <a:t>God</a:t>
+            </a:r>
+            <a:r>
+              <a:rPr lang="de-DE" sz="2600" b="1" dirty="0">
+                <a:latin typeface="Lucida Sans Unicode" pitchFamily="34"/>
+                <a:cs typeface="Lucida Sans Unicode" pitchFamily="34"/>
+              </a:rPr>
+              <a:t>“ -</a:t>
             </a:r>
           </a:p>
         </p:txBody>
@@ -11370,7 +11622,7 @@
         <p:spPr>
           <a:xfrm>
             <a:off x="395536" y="1052736"/>
-            <a:ext cx="8064360" cy="5256000"/>
+            <a:ext cx="8064360" cy="4465410"/>
           </a:xfrm>
           <a:custGeom>
             <a:avLst/>
@@ -11609,7 +11861,28 @@
               <a:t>  </a:t>
             </a:r>
             <a:r>
-              <a:rPr lang="de-DE" sz="3600" b="0" i="0" u="none" strike="noStrike" kern="1200" spc="0" dirty="0" err="1">
+              <a:rPr lang="de-DE" sz="3600" b="0" i="0" u="none" strike="noStrike" kern="1200" spc="0" dirty="0" smtClean="0">
+                <a:ln>
+                  <a:noFill/>
+                </a:ln>
+                <a:solidFill>
+                  <a:srgbClr val="000000"/>
+                </a:solidFill>
+                <a:latin typeface="Cambria" pitchFamily="18"/>
+                <a:ea typeface="Microsoft YaHei" pitchFamily="2"/>
+                <a:cs typeface="Mangal" pitchFamily="2"/>
+              </a:rPr>
+              <a:t>Approach</a:t>
+            </a:r>
+          </a:p>
+          <a:p>
+            <a:pPr marL="1028700" lvl="1" indent="-571500">
+              <a:lnSpc>
+                <a:spcPct val="200000"/>
+              </a:lnSpc>
+            </a:pPr>
+            <a:r>
+              <a:rPr lang="de-DE" sz="3600" b="0" i="0" u="none" strike="noStrike" kern="1200" spc="0" dirty="0" err="1" smtClean="0">
                 <a:ln>
                   <a:noFill/>
                 </a:ln>
@@ -11623,6 +11896,20 @@
               <a:t>Explorative</a:t>
             </a:r>
             <a:r>
+              <a:rPr lang="de-DE" sz="3600" b="0" i="0" u="none" strike="noStrike" kern="1200" spc="0" dirty="0" smtClean="0">
+                <a:ln>
+                  <a:noFill/>
+                </a:ln>
+                <a:solidFill>
+                  <a:srgbClr val="000000"/>
+                </a:solidFill>
+                <a:latin typeface="Cambria" pitchFamily="18"/>
+                <a:ea typeface="Microsoft YaHei" pitchFamily="2"/>
+                <a:cs typeface="Mangal" pitchFamily="2"/>
+              </a:rPr>
+              <a:t> </a:t>
+            </a:r>
+            <a:r>
               <a:rPr lang="de-DE" sz="3600" b="0" i="0" u="none" strike="noStrike" kern="1200" spc="0" dirty="0">
                 <a:ln>
                   <a:noFill/>
@@ -11634,7 +11921,7 @@
                 <a:ea typeface="Microsoft YaHei" pitchFamily="2"/>
                 <a:cs typeface="Mangal" pitchFamily="2"/>
               </a:rPr>
-              <a:t> Data Analysis</a:t>
+              <a:t>Data Analysis</a:t>
             </a:r>
           </a:p>
         </p:txBody>
@@ -12152,7 +12439,7 @@
               <a:t>vs. </a:t>
             </a:r>
             <a:r>
-              <a:rPr lang="de-DE" sz="2800" b="0" i="0" u="none" strike="noStrike" kern="1200" spc="0" dirty="0" err="1" smtClean="0">
+              <a:rPr lang="de-DE" sz="2800" b="0" i="0" u="none" strike="noStrike" kern="1200" spc="0" dirty="0" smtClean="0">
                 <a:ln>
                   <a:noFill/>
                 </a:ln>
@@ -12165,17 +12452,6 @@
               </a:rPr>
               <a:t>OpenGL</a:t>
             </a:r>
-            <a:endParaRPr lang="de-DE" sz="2800" b="0" i="0" u="none" strike="noStrike" kern="1200" spc="0" dirty="0" smtClean="0">
-              <a:ln>
-                <a:noFill/>
-              </a:ln>
-              <a:solidFill>
-                <a:srgbClr val="000000"/>
-              </a:solidFill>
-              <a:latin typeface="Cambria" pitchFamily="18"/>
-              <a:ea typeface="Microsoft YaHei" pitchFamily="2"/>
-              <a:cs typeface="Mangal" pitchFamily="2"/>
-            </a:endParaRPr>
           </a:p>
           <a:p>
             <a:pPr marL="0" marR="0" lvl="0" indent="0" algn="l" rtl="0" hangingPunct="1">
@@ -12197,7 +12473,85 @@
               </a:defRPr>
             </a:pPr>
             <a:r>
+              <a:rPr lang="de-DE" sz="2800" dirty="0">
+                <a:solidFill>
+                  <a:srgbClr val="000000"/>
+                </a:solidFill>
+                <a:latin typeface="Cambria" pitchFamily="18"/>
+                <a:ea typeface="Microsoft YaHei" pitchFamily="2"/>
+                <a:cs typeface="Mangal" pitchFamily="2"/>
+              </a:rPr>
+              <a:t> </a:t>
+            </a:r>
+            <a:r>
               <a:rPr lang="de-DE" sz="2800" dirty="0" smtClean="0">
+                <a:solidFill>
+                  <a:srgbClr val="000000"/>
+                </a:solidFill>
+                <a:latin typeface="Cambria" pitchFamily="18"/>
+                <a:ea typeface="Microsoft YaHei" pitchFamily="2"/>
+                <a:cs typeface="Mangal" pitchFamily="2"/>
+              </a:rPr>
+              <a:t>Large Dataset Iteration (</a:t>
+            </a:r>
+            <a:r>
+              <a:rPr lang="de-DE" sz="2800" dirty="0" err="1" smtClean="0">
+                <a:solidFill>
+                  <a:srgbClr val="000000"/>
+                </a:solidFill>
+                <a:latin typeface="Cambria" pitchFamily="18"/>
+                <a:ea typeface="Microsoft YaHei" pitchFamily="2"/>
+                <a:cs typeface="Mangal" pitchFamily="2"/>
+              </a:rPr>
+              <a:t>unoptimized</a:t>
+            </a:r>
+            <a:r>
+              <a:rPr lang="de-DE" sz="2800" dirty="0" smtClean="0">
+                <a:solidFill>
+                  <a:srgbClr val="000000"/>
+                </a:solidFill>
+                <a:latin typeface="Cambria" pitchFamily="18"/>
+                <a:ea typeface="Microsoft YaHei" pitchFamily="2"/>
+                <a:cs typeface="Mangal" pitchFamily="2"/>
+              </a:rPr>
+              <a:t> / </a:t>
+            </a:r>
+            <a:r>
+              <a:rPr lang="de-DE" sz="2800" dirty="0" err="1" smtClean="0">
+                <a:solidFill>
+                  <a:srgbClr val="000000"/>
+                </a:solidFill>
+                <a:latin typeface="Cambria" pitchFamily="18"/>
+                <a:ea typeface="Microsoft YaHei" pitchFamily="2"/>
+                <a:cs typeface="Mangal" pitchFamily="2"/>
+              </a:rPr>
+              <a:t>windows</a:t>
+            </a:r>
+            <a:r>
+              <a:rPr lang="de-DE" sz="2800" dirty="0" smtClean="0">
+                <a:solidFill>
+                  <a:srgbClr val="000000"/>
+                </a:solidFill>
+                <a:latin typeface="Cambria" pitchFamily="18"/>
+                <a:ea typeface="Microsoft YaHei" pitchFamily="2"/>
+                <a:cs typeface="Mangal" pitchFamily="2"/>
+              </a:rPr>
+              <a:t>)</a:t>
+            </a:r>
+          </a:p>
+          <a:p>
+            <a:pPr lvl="1">
+              <a:lnSpc>
+                <a:spcPct val="200000"/>
+              </a:lnSpc>
+              <a:buFont typeface="StarSymbol"/>
+              <a:buChar char="•"/>
+              <a:defRPr sz="1800">
+                <a:latin typeface="Cambria" pitchFamily="18"/>
+              </a:defRPr>
+            </a:pPr>
+            <a:r>
+              <a:rPr lang="de-DE" sz="2800" dirty="0">
                 <a:solidFill>
                   <a:srgbClr val="000000"/>
                 </a:solidFill>
@@ -12227,7 +12581,7 @@
                 <a:ea typeface="Microsoft YaHei" pitchFamily="2"/>
                 <a:cs typeface="Mangal" pitchFamily="2"/>
               </a:rPr>
-              <a:t> </a:t>
+              <a:t>::</a:t>
             </a:r>
             <a:r>
               <a:rPr lang="de-DE" sz="2800" dirty="0" err="1" smtClean="0">
@@ -12249,7 +12603,18 @@
                 <a:ea typeface="Microsoft YaHei" pitchFamily="2"/>
                 <a:cs typeface="Mangal" pitchFamily="2"/>
               </a:rPr>
-              <a:t>() </a:t>
+              <a:t>() – Slow (</a:t>
+            </a:r>
+            <a:r>
+              <a:rPr lang="de-DE" sz="2800" dirty="0" err="1" smtClean="0">
+                <a:solidFill>
+                  <a:srgbClr val="000000"/>
+                </a:solidFill>
+                <a:latin typeface="Cambria" pitchFamily="18"/>
+                <a:ea typeface="Microsoft YaHei" pitchFamily="2"/>
+                <a:cs typeface="Mangal" pitchFamily="2"/>
+              </a:rPr>
+              <a:t>Known</a:t>
             </a:r>
             <a:r>
               <a:rPr lang="de-DE" sz="2800" dirty="0" smtClean="0">
@@ -12259,9 +12624,42 @@
                 <a:latin typeface="Cambria" pitchFamily="18"/>
                 <a:ea typeface="Microsoft YaHei" pitchFamily="2"/>
                 <a:cs typeface="Mangal" pitchFamily="2"/>
-                <a:sym typeface="Wingdings" pitchFamily="2" charset="2"/>
               </a:rPr>
-              <a:t> </a:t>
+              <a:t> Bug)</a:t>
+            </a:r>
+          </a:p>
+          <a:p>
+            <a:pPr lvl="1">
+              <a:lnSpc>
+                <a:spcPct val="200000"/>
+              </a:lnSpc>
+              <a:buFont typeface="StarSymbol"/>
+              <a:buChar char="•"/>
+              <a:defRPr sz="1800">
+                <a:latin typeface="Cambria" pitchFamily="18"/>
+              </a:defRPr>
+            </a:pPr>
+            <a:r>
+              <a:rPr lang="de-DE" sz="2800" dirty="0">
+                <a:solidFill>
+                  <a:srgbClr val="000000"/>
+                </a:solidFill>
+                <a:latin typeface="Cambria" pitchFamily="18"/>
+                <a:ea typeface="Microsoft YaHei" pitchFamily="2"/>
+                <a:cs typeface="Mangal" pitchFamily="2"/>
+              </a:rPr>
+              <a:t> </a:t>
+            </a:r>
+            <a:r>
+              <a:rPr lang="de-DE" sz="2800" dirty="0" err="1" smtClean="0">
+                <a:solidFill>
+                  <a:srgbClr val="000000"/>
+                </a:solidFill>
+                <a:latin typeface="Cambria" pitchFamily="18"/>
+                <a:ea typeface="Microsoft YaHei" pitchFamily="2"/>
+                <a:cs typeface="Mangal" pitchFamily="2"/>
+              </a:rPr>
+              <a:t>QtDirIterator</a:t>
             </a:r>
             <a:r>
               <a:rPr lang="de-DE" sz="2800" dirty="0" smtClean="0">
@@ -12271,110 +12669,10 @@
                 <a:latin typeface="Cambria" pitchFamily="18"/>
                 <a:ea typeface="Microsoft YaHei" pitchFamily="2"/>
                 <a:cs typeface="Mangal" pitchFamily="2"/>
-                <a:sym typeface="Wingdings" pitchFamily="2" charset="2"/>
               </a:rPr>
-              <a:t>langsam</a:t>
-            </a:r>
-          </a:p>
-          <a:p>
-            <a:pPr marL="0" marR="0" lvl="0" indent="0" algn="l" rtl="0" hangingPunct="1">
-              <a:lnSpc>
-                <a:spcPct val="200000"/>
-              </a:lnSpc>
-              <a:spcBef>
-                <a:spcPts val="0"/>
-              </a:spcBef>
-              <a:spcAft>
-                <a:spcPts val="0"/>
-              </a:spcAft>
-              <a:buSzPct val="45000"/>
-              <a:buFont typeface="StarSymbol"/>
-              <a:buChar char="•"/>
-              <a:tabLst/>
-              <a:defRPr sz="1800">
-                <a:latin typeface="Cambria" pitchFamily="18"/>
-              </a:defRPr>
-            </a:pPr>
-            <a:r>
-              <a:rPr lang="de-DE" sz="2800" b="0" i="0" u="none" strike="noStrike" kern="1200" spc="0" dirty="0" smtClean="0">
-                <a:ln>
-                  <a:noFill/>
-                </a:ln>
-                <a:solidFill>
-                  <a:srgbClr val="000000"/>
-                </a:solidFill>
-                <a:latin typeface="Cambria" pitchFamily="18"/>
-                <a:ea typeface="Microsoft YaHei" pitchFamily="2"/>
-                <a:cs typeface="Mangal" pitchFamily="2"/>
-                <a:sym typeface="Wingdings" pitchFamily="2" charset="2"/>
-              </a:rPr>
-              <a:t> </a:t>
-            </a:r>
-            <a:r>
-              <a:rPr lang="de-DE" sz="2800" b="0" i="0" u="none" strike="noStrike" kern="1200" spc="0" dirty="0" err="1" smtClean="0">
-                <a:ln>
-                  <a:noFill/>
-                </a:ln>
-                <a:solidFill>
-                  <a:srgbClr val="000000"/>
-                </a:solidFill>
-                <a:latin typeface="Cambria" pitchFamily="18"/>
-                <a:ea typeface="Microsoft YaHei" pitchFamily="2"/>
-                <a:cs typeface="Mangal" pitchFamily="2"/>
-                <a:sym typeface="Wingdings" pitchFamily="2" charset="2"/>
-              </a:rPr>
-              <a:t>QtDirOperator</a:t>
-            </a:r>
-            <a:r>
-              <a:rPr lang="de-DE" sz="2800" b="0" i="0" u="none" strike="noStrike" kern="1200" spc="0" dirty="0" smtClean="0">
-                <a:ln>
-                  <a:noFill/>
-                </a:ln>
-                <a:solidFill>
-                  <a:srgbClr val="000000"/>
-                </a:solidFill>
-                <a:latin typeface="Cambria" pitchFamily="18"/>
-                <a:ea typeface="Microsoft YaHei" pitchFamily="2"/>
-                <a:cs typeface="Mangal" pitchFamily="2"/>
-                <a:sym typeface="Wingdings" pitchFamily="2" charset="2"/>
-              </a:rPr>
-              <a:t> benötigt  ebenfalls 5 Minuten</a:t>
-            </a:r>
-            <a:endParaRPr lang="de-DE" sz="2800" b="0" i="0" u="none" strike="noStrike" kern="1200" spc="0" dirty="0">
-              <a:ln>
-                <a:noFill/>
-              </a:ln>
-              <a:solidFill>
-                <a:srgbClr val="000000"/>
-              </a:solidFill>
-              <a:latin typeface="Cambria" pitchFamily="18"/>
-              <a:ea typeface="Microsoft YaHei" pitchFamily="2"/>
-              <a:cs typeface="Mangal" pitchFamily="2"/>
-            </a:endParaRPr>
-          </a:p>
-          <a:p>
-            <a:pPr marL="0" marR="0" lvl="0" indent="0" algn="l" rtl="0" hangingPunct="1">
-              <a:lnSpc>
-                <a:spcPct val="200000"/>
-              </a:lnSpc>
-              <a:spcBef>
-                <a:spcPts val="0"/>
-              </a:spcBef>
-              <a:spcAft>
-                <a:spcPts val="0"/>
-              </a:spcAft>
-              <a:buSzPct val="45000"/>
-              <a:buFont typeface="StarSymbol"/>
-              <a:buChar char="•"/>
-              <a:tabLst/>
-              <a:defRPr sz="1800">
-                <a:latin typeface="Cambria" pitchFamily="18"/>
-              </a:defRPr>
-            </a:pPr>
-            <a:endParaRPr lang="de-DE" sz="2800" b="0" i="0" u="none" strike="noStrike" kern="1200" spc="0" dirty="0">
-              <a:ln>
-                <a:noFill/>
-              </a:ln>
+              <a:t> –9200 Files ~5min</a:t>
+            </a:r>
+            <a:endParaRPr lang="de-DE" sz="2800" dirty="0">
               <a:solidFill>
                 <a:srgbClr val="000000"/>
               </a:solidFill>
@@ -13276,7 +13574,7 @@
         <p:spPr>
           <a:xfrm>
             <a:off x="4752000" y="216000"/>
-            <a:ext cx="4176000" cy="576000"/>
+            <a:ext cx="4176000" cy="481755"/>
           </a:xfrm>
           <a:custGeom>
             <a:avLst/>
@@ -13401,7 +13699,7 @@
               </a:defRPr>
             </a:pPr>
             <a:r>
-              <a:rPr lang="de-DE" sz="2600" b="0" i="0" u="none" strike="noStrike" kern="1200" spc="0">
+              <a:rPr lang="de-DE" sz="2600" b="0" i="0" u="none" strike="noStrike" kern="1200" spc="0" dirty="0">
                 <a:ln>
                   <a:noFill/>
                 </a:ln>
@@ -13412,8 +13710,33 @@
                 <a:ea typeface="Microsoft YaHei" pitchFamily="2"/>
                 <a:cs typeface="Mangal" pitchFamily="2"/>
               </a:rPr>
-              <a:t>3. Explorative Data Analysis</a:t>
-            </a:r>
+              <a:t>3. </a:t>
+            </a:r>
+            <a:r>
+              <a:rPr lang="de-DE" sz="2600" b="0" i="0" u="none" strike="noStrike" kern="1200" spc="0" dirty="0" smtClean="0">
+                <a:ln>
+                  <a:noFill/>
+                </a:ln>
+                <a:solidFill>
+                  <a:srgbClr val="000000"/>
+                </a:solidFill>
+                <a:latin typeface="Cambria" pitchFamily="18"/>
+                <a:ea typeface="Microsoft YaHei" pitchFamily="2"/>
+                <a:cs typeface="Mangal" pitchFamily="2"/>
+              </a:rPr>
+              <a:t>Approach</a:t>
+            </a:r>
+            <a:endParaRPr lang="de-DE" sz="2600" b="0" i="0" u="none" strike="noStrike" kern="1200" spc="0" dirty="0">
+              <a:ln>
+                <a:noFill/>
+              </a:ln>
+              <a:solidFill>
+                <a:srgbClr val="000000"/>
+              </a:solidFill>
+              <a:latin typeface="Cambria" pitchFamily="18"/>
+              <a:ea typeface="Microsoft YaHei" pitchFamily="2"/>
+              <a:cs typeface="Mangal" pitchFamily="2"/>
+            </a:endParaRPr>
           </a:p>
         </p:txBody>
       </p:sp>
@@ -13523,6 +13846,47 @@
           </a:p>
         </p:txBody>
       </p:sp>
+      <p:pic>
+        <p:nvPicPr>
+          <p:cNvPr id="1027" name="Picture 3" descr="E:\pro\img-classification-ss13\doc\PPT-2013-05-22\graph-pipeline-vert.png"/>
+          <p:cNvPicPr>
+            <a:picLocks noChangeAspect="1" noChangeArrowheads="1"/>
+          </p:cNvPicPr>
+          <p:nvPr/>
+        </p:nvPicPr>
+        <p:blipFill>
+          <a:blip r:embed="rId3">
+            <a:extLst>
+              <a:ext uri="{28A0092B-C50C-407E-A947-70E740481C1C}">
+                <a14:useLocalDpi xmlns:a14="http://schemas.microsoft.com/office/drawing/2010/main" val="0"/>
+              </a:ext>
+            </a:extLst>
+          </a:blip>
+          <a:srcRect/>
+          <a:stretch>
+            <a:fillRect/>
+          </a:stretch>
+        </p:blipFill>
+        <p:spPr bwMode="auto">
+          <a:xfrm>
+            <a:off x="244928" y="1340768"/>
+            <a:ext cx="8629219" cy="4536504"/>
+          </a:xfrm>
+          <a:prstGeom prst="rect">
+            <a:avLst/>
+          </a:prstGeom>
+          <a:noFill/>
+          <a:extLst>
+            <a:ext uri="{909E8E84-426E-40DD-AFC4-6F175D3DCCD1}">
+              <a14:hiddenFill xmlns:a14="http://schemas.microsoft.com/office/drawing/2010/main">
+                <a:solidFill>
+                  <a:srgbClr val="FFFFFF"/>
+                </a:solidFill>
+              </a14:hiddenFill>
+            </a:ext>
+          </a:extLst>
+        </p:spPr>
+      </p:pic>
     </p:spTree>
   </p:cSld>
   <p:clrMapOvr>
@@ -13540,6 +13904,1120 @@
 </file>
 
 <file path=ppt/slides/slide6.xml><?xml version="1.0" encoding="utf-8"?>
+<p:sld xmlns:a="http://schemas.openxmlformats.org/drawingml/2006/main" xmlns:r="http://schemas.openxmlformats.org/officeDocument/2006/relationships" xmlns:p="http://schemas.openxmlformats.org/presentationml/2006/main">
+  <p:cSld>
+    <p:spTree>
+      <p:nvGrpSpPr>
+        <p:cNvPr id="1" name=""/>
+        <p:cNvGrpSpPr/>
+        <p:nvPr/>
+      </p:nvGrpSpPr>
+      <p:grpSpPr>
+        <a:xfrm>
+          <a:off x="0" y="0"/>
+          <a:ext cx="0" cy="0"/>
+          <a:chOff x="0" y="0"/>
+          <a:chExt cx="0" cy="0"/>
+        </a:xfrm>
+      </p:grpSpPr>
+      <p:sp>
+        <p:nvSpPr>
+          <p:cNvPr id="2" name="Textfeld 5"/>
+          <p:cNvSpPr/>
+          <p:nvPr/>
+        </p:nvSpPr>
+        <p:spPr>
+          <a:xfrm>
+            <a:off x="432000" y="792000"/>
+            <a:ext cx="8064360" cy="5256000"/>
+          </a:xfrm>
+          <a:custGeom>
+            <a:avLst/>
+            <a:gdLst>
+              <a:gd name="f0" fmla="val 0"/>
+              <a:gd name="f1" fmla="val 21600"/>
+            </a:gdLst>
+            <a:ahLst/>
+            <a:cxnLst>
+              <a:cxn ang="3cd4">
+                <a:pos x="hc" y="t"/>
+              </a:cxn>
+              <a:cxn ang="0">
+                <a:pos x="r" y="vc"/>
+              </a:cxn>
+              <a:cxn ang="cd4">
+                <a:pos x="hc" y="b"/>
+              </a:cxn>
+              <a:cxn ang="cd2">
+                <a:pos x="l" y="vc"/>
+              </a:cxn>
+            </a:cxnLst>
+            <a:rect l="l" t="t" r="r" b="b"/>
+            <a:pathLst>
+              <a:path w="21600" h="21600">
+                <a:moveTo>
+                  <a:pt x="f0" y="f0"/>
+                </a:moveTo>
+                <a:lnTo>
+                  <a:pt x="f1" y="f0"/>
+                </a:lnTo>
+                <a:lnTo>
+                  <a:pt x="f1" y="f1"/>
+                </a:lnTo>
+                <a:lnTo>
+                  <a:pt x="f0" y="f1"/>
+                </a:lnTo>
+                <a:lnTo>
+                  <a:pt x="f0" y="f0"/>
+                </a:lnTo>
+                <a:close/>
+              </a:path>
+            </a:pathLst>
+          </a:custGeom>
+          <a:noFill/>
+          <a:ln>
+            <a:noFill/>
+            <a:prstDash val="solid"/>
+          </a:ln>
+        </p:spPr>
+        <p:txBody>
+          <a:bodyPr vert="horz" wrap="square" lIns="90000" tIns="45000" rIns="90000" bIns="45000" anchor="t" anchorCtr="0" compatLnSpc="0">
+            <a:spAutoFit/>
+          </a:bodyPr>
+          <a:lstStyle>
+            <a:defPPr lvl="0">
+              <a:buSzPct val="45000"/>
+              <a:buFont typeface="StarSymbol"/>
+              <a:buNone/>
+            </a:defPPr>
+            <a:lvl1pPr lvl="0">
+              <a:buSzPct val="45000"/>
+              <a:buFont typeface="StarSymbol"/>
+              <a:buChar char="●"/>
+            </a:lvl1pPr>
+            <a:lvl2pPr lvl="1">
+              <a:buSzPct val="45000"/>
+              <a:buFont typeface="StarSymbol"/>
+              <a:buChar char="●"/>
+            </a:lvl2pPr>
+            <a:lvl3pPr lvl="2">
+              <a:buSzPct val="45000"/>
+              <a:buFont typeface="StarSymbol"/>
+              <a:buChar char="●"/>
+            </a:lvl3pPr>
+            <a:lvl4pPr lvl="3">
+              <a:buSzPct val="45000"/>
+              <a:buFont typeface="StarSymbol"/>
+              <a:buChar char="●"/>
+            </a:lvl4pPr>
+            <a:lvl5pPr lvl="4">
+              <a:buSzPct val="45000"/>
+              <a:buFont typeface="StarSymbol"/>
+              <a:buChar char="●"/>
+            </a:lvl5pPr>
+            <a:lvl6pPr lvl="5">
+              <a:buSzPct val="45000"/>
+              <a:buFont typeface="StarSymbol"/>
+              <a:buChar char="●"/>
+            </a:lvl6pPr>
+            <a:lvl7pPr lvl="6">
+              <a:buSzPct val="45000"/>
+              <a:buFont typeface="StarSymbol"/>
+              <a:buChar char="●"/>
+            </a:lvl7pPr>
+            <a:lvl8pPr lvl="7">
+              <a:buSzPct val="45000"/>
+              <a:buFont typeface="StarSymbol"/>
+              <a:buChar char="●"/>
+            </a:lvl8pPr>
+            <a:lvl9pPr lvl="8">
+              <a:buSzPct val="45000"/>
+              <a:buFont typeface="StarSymbol"/>
+              <a:buChar char="●"/>
+            </a:lvl9pPr>
+          </a:lstStyle>
+          <a:p>
+            <a:pPr marL="0" marR="0" lvl="0" indent="0" rtl="0" hangingPunct="0">
+              <a:lnSpc>
+                <a:spcPct val="100000"/>
+              </a:lnSpc>
+              <a:spcBef>
+                <a:spcPts val="0"/>
+              </a:spcBef>
+              <a:spcAft>
+                <a:spcPts val="0"/>
+              </a:spcAft>
+              <a:buNone/>
+              <a:tabLst/>
+            </a:pPr>
+            <a:endParaRPr lang="de-DE" sz="1800" b="0" i="0" u="none" strike="noStrike" kern="1200">
+              <a:ln>
+                <a:noFill/>
+              </a:ln>
+              <a:latin typeface="Arial" pitchFamily="18"/>
+              <a:ea typeface="Microsoft YaHei" pitchFamily="2"/>
+              <a:cs typeface="Mangal" pitchFamily="2"/>
+            </a:endParaRPr>
+          </a:p>
+        </p:txBody>
+      </p:sp>
+      <p:sp>
+        <p:nvSpPr>
+          <p:cNvPr id="3" name="Textfeld 6"/>
+          <p:cNvSpPr/>
+          <p:nvPr/>
+        </p:nvSpPr>
+        <p:spPr>
+          <a:xfrm>
+            <a:off x="4752000" y="216000"/>
+            <a:ext cx="4176000" cy="481755"/>
+          </a:xfrm>
+          <a:custGeom>
+            <a:avLst/>
+            <a:gdLst>
+              <a:gd name="f0" fmla="val 0"/>
+              <a:gd name="f1" fmla="val 21600"/>
+            </a:gdLst>
+            <a:ahLst/>
+            <a:cxnLst>
+              <a:cxn ang="3cd4">
+                <a:pos x="hc" y="t"/>
+              </a:cxn>
+              <a:cxn ang="0">
+                <a:pos x="r" y="vc"/>
+              </a:cxn>
+              <a:cxn ang="cd4">
+                <a:pos x="hc" y="b"/>
+              </a:cxn>
+              <a:cxn ang="cd2">
+                <a:pos x="l" y="vc"/>
+              </a:cxn>
+            </a:cxnLst>
+            <a:rect l="l" t="t" r="r" b="b"/>
+            <a:pathLst>
+              <a:path w="21600" h="21600">
+                <a:moveTo>
+                  <a:pt x="f0" y="f0"/>
+                </a:moveTo>
+                <a:lnTo>
+                  <a:pt x="f1" y="f0"/>
+                </a:lnTo>
+                <a:lnTo>
+                  <a:pt x="f1" y="f1"/>
+                </a:lnTo>
+                <a:lnTo>
+                  <a:pt x="f0" y="f1"/>
+                </a:lnTo>
+                <a:lnTo>
+                  <a:pt x="f0" y="f0"/>
+                </a:lnTo>
+                <a:close/>
+              </a:path>
+            </a:pathLst>
+          </a:custGeom>
+          <a:noFill/>
+          <a:ln>
+            <a:noFill/>
+            <a:prstDash val="solid"/>
+          </a:ln>
+        </p:spPr>
+        <p:txBody>
+          <a:bodyPr vert="horz" wrap="square" lIns="90000" tIns="45000" rIns="90000" bIns="45000" anchor="t" anchorCtr="0" compatLnSpc="0">
+            <a:spAutoFit/>
+          </a:bodyPr>
+          <a:lstStyle>
+            <a:defPPr lvl="0">
+              <a:buSzPct val="45000"/>
+              <a:buFont typeface="StarSymbol"/>
+              <a:buNone/>
+            </a:defPPr>
+            <a:lvl1pPr lvl="0">
+              <a:buSzPct val="45000"/>
+              <a:buFont typeface="StarSymbol"/>
+              <a:buChar char="●"/>
+            </a:lvl1pPr>
+            <a:lvl2pPr lvl="1">
+              <a:buSzPct val="45000"/>
+              <a:buFont typeface="StarSymbol"/>
+              <a:buChar char="●"/>
+            </a:lvl2pPr>
+            <a:lvl3pPr lvl="2">
+              <a:buSzPct val="45000"/>
+              <a:buFont typeface="StarSymbol"/>
+              <a:buChar char="●"/>
+            </a:lvl3pPr>
+            <a:lvl4pPr lvl="3">
+              <a:buSzPct val="45000"/>
+              <a:buFont typeface="StarSymbol"/>
+              <a:buChar char="●"/>
+            </a:lvl4pPr>
+            <a:lvl5pPr lvl="4">
+              <a:buSzPct val="45000"/>
+              <a:buFont typeface="StarSymbol"/>
+              <a:buChar char="●"/>
+            </a:lvl5pPr>
+            <a:lvl6pPr lvl="5">
+              <a:buSzPct val="45000"/>
+              <a:buFont typeface="StarSymbol"/>
+              <a:buChar char="●"/>
+            </a:lvl6pPr>
+            <a:lvl7pPr lvl="6">
+              <a:buSzPct val="45000"/>
+              <a:buFont typeface="StarSymbol"/>
+              <a:buChar char="●"/>
+            </a:lvl7pPr>
+            <a:lvl8pPr lvl="7">
+              <a:buSzPct val="45000"/>
+              <a:buFont typeface="StarSymbol"/>
+              <a:buChar char="●"/>
+            </a:lvl8pPr>
+            <a:lvl9pPr lvl="8">
+              <a:buSzPct val="45000"/>
+              <a:buFont typeface="StarSymbol"/>
+              <a:buChar char="●"/>
+            </a:lvl9pPr>
+          </a:lstStyle>
+          <a:p>
+            <a:pPr marL="0" marR="0" lvl="0" indent="0" algn="r" rtl="0" hangingPunct="1">
+              <a:lnSpc>
+                <a:spcPct val="100000"/>
+              </a:lnSpc>
+              <a:spcBef>
+                <a:spcPts val="0"/>
+              </a:spcBef>
+              <a:spcAft>
+                <a:spcPts val="0"/>
+              </a:spcAft>
+              <a:buNone/>
+              <a:tabLst/>
+              <a:defRPr sz="2600">
+                <a:latin typeface="Cambria" pitchFamily="18"/>
+              </a:defRPr>
+            </a:pPr>
+            <a:r>
+              <a:rPr lang="de-DE" sz="2600" b="0" i="0" u="none" strike="noStrike" kern="1200" spc="0" dirty="0">
+                <a:ln>
+                  <a:noFill/>
+                </a:ln>
+                <a:solidFill>
+                  <a:srgbClr val="000000"/>
+                </a:solidFill>
+                <a:latin typeface="Cambria" pitchFamily="18"/>
+                <a:ea typeface="Microsoft YaHei" pitchFamily="2"/>
+                <a:cs typeface="Mangal" pitchFamily="2"/>
+              </a:rPr>
+              <a:t>3. </a:t>
+            </a:r>
+            <a:r>
+              <a:rPr lang="de-DE" sz="2600" b="0" i="0" u="none" strike="noStrike" kern="1200" spc="0" dirty="0" smtClean="0">
+                <a:ln>
+                  <a:noFill/>
+                </a:ln>
+                <a:solidFill>
+                  <a:srgbClr val="000000"/>
+                </a:solidFill>
+                <a:latin typeface="Cambria" pitchFamily="18"/>
+                <a:ea typeface="Microsoft YaHei" pitchFamily="2"/>
+                <a:cs typeface="Mangal" pitchFamily="2"/>
+              </a:rPr>
+              <a:t>Approach</a:t>
+            </a:r>
+            <a:endParaRPr lang="de-DE" sz="2600" b="0" i="0" u="none" strike="noStrike" kern="1200" spc="0" dirty="0">
+              <a:ln>
+                <a:noFill/>
+              </a:ln>
+              <a:solidFill>
+                <a:srgbClr val="000000"/>
+              </a:solidFill>
+              <a:latin typeface="Cambria" pitchFamily="18"/>
+              <a:ea typeface="Microsoft YaHei" pitchFamily="2"/>
+              <a:cs typeface="Mangal" pitchFamily="2"/>
+            </a:endParaRPr>
+          </a:p>
+        </p:txBody>
+      </p:sp>
+      <p:sp>
+        <p:nvSpPr>
+          <p:cNvPr id="4" name="Textfeld 3"/>
+          <p:cNvSpPr txBox="1"/>
+          <p:nvPr/>
+        </p:nvSpPr>
+        <p:spPr>
+          <a:xfrm>
+            <a:off x="72000" y="6408000"/>
+            <a:ext cx="3888000" cy="358560"/>
+          </a:xfrm>
+          <a:prstGeom prst="rect">
+            <a:avLst/>
+          </a:prstGeom>
+          <a:noFill/>
+          <a:ln>
+            <a:noFill/>
+          </a:ln>
+        </p:spPr>
+        <p:txBody>
+          <a:bodyPr vert="horz" wrap="none" lIns="90000" tIns="45000" rIns="90000" bIns="45000" anchorCtr="0" compatLnSpc="0">
+            <a:spAutoFit/>
+          </a:bodyPr>
+          <a:lstStyle>
+            <a:defPPr lvl="0">
+              <a:buSzPct val="45000"/>
+              <a:buFont typeface="StarSymbol"/>
+              <a:buNone/>
+            </a:defPPr>
+            <a:lvl1pPr lvl="0">
+              <a:buSzPct val="45000"/>
+              <a:buFont typeface="StarSymbol"/>
+              <a:buChar char="●"/>
+            </a:lvl1pPr>
+            <a:lvl2pPr lvl="1">
+              <a:buSzPct val="45000"/>
+              <a:buFont typeface="StarSymbol"/>
+              <a:buChar char="●"/>
+            </a:lvl2pPr>
+            <a:lvl3pPr lvl="2">
+              <a:buSzPct val="45000"/>
+              <a:buFont typeface="StarSymbol"/>
+              <a:buChar char="●"/>
+            </a:lvl3pPr>
+            <a:lvl4pPr lvl="3">
+              <a:buSzPct val="45000"/>
+              <a:buFont typeface="StarSymbol"/>
+              <a:buChar char="●"/>
+            </a:lvl4pPr>
+            <a:lvl5pPr lvl="4">
+              <a:buSzPct val="45000"/>
+              <a:buFont typeface="StarSymbol"/>
+              <a:buChar char="●"/>
+            </a:lvl5pPr>
+            <a:lvl6pPr lvl="5">
+              <a:buSzPct val="45000"/>
+              <a:buFont typeface="StarSymbol"/>
+              <a:buChar char="●"/>
+            </a:lvl6pPr>
+            <a:lvl7pPr lvl="6">
+              <a:buSzPct val="45000"/>
+              <a:buFont typeface="StarSymbol"/>
+              <a:buChar char="●"/>
+            </a:lvl7pPr>
+            <a:lvl8pPr lvl="7">
+              <a:buSzPct val="45000"/>
+              <a:buFont typeface="StarSymbol"/>
+              <a:buChar char="●"/>
+            </a:lvl8pPr>
+            <a:lvl9pPr lvl="8">
+              <a:buSzPct val="45000"/>
+              <a:buFont typeface="StarSymbol"/>
+              <a:buChar char="●"/>
+            </a:lvl9pPr>
+          </a:lstStyle>
+          <a:p>
+            <a:pPr marL="0" marR="0" lvl="0" indent="0" rtl="0" hangingPunct="0">
+              <a:lnSpc>
+                <a:spcPct val="100000"/>
+              </a:lnSpc>
+              <a:spcBef>
+                <a:spcPts val="0"/>
+              </a:spcBef>
+              <a:spcAft>
+                <a:spcPts val="0"/>
+              </a:spcAft>
+              <a:buNone/>
+              <a:tabLst/>
+              <a:defRPr>
+                <a:latin typeface="Cambria" pitchFamily="18"/>
+              </a:defRPr>
+            </a:pPr>
+            <a:r>
+              <a:rPr lang="de-DE" sz="1800" b="0" i="0" u="none" strike="noStrike" kern="1200">
+                <a:ln>
+                  <a:noFill/>
+                </a:ln>
+                <a:latin typeface="Cambria" pitchFamily="18"/>
+                <a:ea typeface="Microsoft YaHei" pitchFamily="2"/>
+                <a:cs typeface="Mangal" pitchFamily="2"/>
+              </a:rPr>
+              <a:t>Project Samael</a:t>
+            </a:r>
+          </a:p>
+        </p:txBody>
+      </p:sp>
+      <p:pic>
+        <p:nvPicPr>
+          <p:cNvPr id="2050" name="Picture 2" descr="E:\pro\img-classification-ss13\doc\PPT-2013-05-22\graph-pipeline.png"/>
+          <p:cNvPicPr>
+            <a:picLocks noChangeAspect="1" noChangeArrowheads="1"/>
+          </p:cNvPicPr>
+          <p:nvPr/>
+        </p:nvPicPr>
+        <p:blipFill>
+          <a:blip r:embed="rId3">
+            <a:extLst>
+              <a:ext uri="{28A0092B-C50C-407E-A947-70E740481C1C}">
+                <a14:useLocalDpi xmlns:a14="http://schemas.microsoft.com/office/drawing/2010/main" val="0"/>
+              </a:ext>
+            </a:extLst>
+          </a:blip>
+          <a:srcRect/>
+          <a:stretch>
+            <a:fillRect/>
+          </a:stretch>
+        </p:blipFill>
+        <p:spPr bwMode="auto">
+          <a:xfrm>
+            <a:off x="-610346" y="1412776"/>
+            <a:ext cx="4534274" cy="10375913"/>
+          </a:xfrm>
+          <a:prstGeom prst="rect">
+            <a:avLst/>
+          </a:prstGeom>
+          <a:noFill/>
+          <a:extLst>
+            <a:ext uri="{909E8E84-426E-40DD-AFC4-6F175D3DCCD1}">
+              <a14:hiddenFill xmlns:a14="http://schemas.microsoft.com/office/drawing/2010/main">
+                <a:solidFill>
+                  <a:srgbClr val="FFFFFF"/>
+                </a:solidFill>
+              </a14:hiddenFill>
+            </a:ext>
+          </a:extLst>
+        </p:spPr>
+      </p:pic>
+      <p:pic>
+        <p:nvPicPr>
+          <p:cNvPr id="2051" name="Picture 3" descr="E:\pro\img-classification-ss13\doc\PPT-2013-05-22\screenshot.jpg"/>
+          <p:cNvPicPr>
+            <a:picLocks noChangeAspect="1" noChangeArrowheads="1"/>
+          </p:cNvPicPr>
+          <p:nvPr/>
+        </p:nvPicPr>
+        <p:blipFill>
+          <a:blip r:embed="rId4">
+            <a:extLst>
+              <a:ext uri="{28A0092B-C50C-407E-A947-70E740481C1C}">
+                <a14:useLocalDpi xmlns:a14="http://schemas.microsoft.com/office/drawing/2010/main" val="0"/>
+              </a:ext>
+            </a:extLst>
+          </a:blip>
+          <a:srcRect/>
+          <a:stretch>
+            <a:fillRect/>
+          </a:stretch>
+        </p:blipFill>
+        <p:spPr bwMode="auto">
+          <a:xfrm>
+            <a:off x="958716" y="931542"/>
+            <a:ext cx="7357700" cy="5233393"/>
+          </a:xfrm>
+          <a:prstGeom prst="rect">
+            <a:avLst/>
+          </a:prstGeom>
+          <a:noFill/>
+          <a:extLst>
+            <a:ext uri="{909E8E84-426E-40DD-AFC4-6F175D3DCCD1}">
+              <a14:hiddenFill xmlns:a14="http://schemas.microsoft.com/office/drawing/2010/main">
+                <a:solidFill>
+                  <a:srgbClr val="FFFFFF"/>
+                </a:solidFill>
+              </a14:hiddenFill>
+            </a:ext>
+          </a:extLst>
+        </p:spPr>
+      </p:pic>
+    </p:spTree>
+    <p:extLst>
+      <p:ext uri="{BB962C8B-B14F-4D97-AF65-F5344CB8AC3E}">
+        <p14:creationId xmlns:p14="http://schemas.microsoft.com/office/powerpoint/2010/main" val="860911770"/>
+      </p:ext>
+    </p:extLst>
+  </p:cSld>
+  <p:clrMapOvr>
+    <a:masterClrMapping/>
+  </p:clrMapOvr>
+  <p:transition/>
+  <p:timing>
+    <p:tnLst>
+      <p:par>
+        <p:cTn id="1" dur="indefinite" restart="never" nodeType="tmRoot">
+          <p:childTnLst>
+            <p:seq concurrent="1" nextAc="seek">
+              <p:cTn id="2" dur="indefinite" nodeType="mainSeq">
+                <p:childTnLst>
+                  <p:par>
+                    <p:cTn id="3" fill="hold">
+                      <p:stCondLst>
+                        <p:cond delay="indefinite"/>
+                      </p:stCondLst>
+                      <p:childTnLst>
+                        <p:par>
+                          <p:cTn id="4" fill="hold">
+                            <p:stCondLst>
+                              <p:cond delay="0"/>
+                            </p:stCondLst>
+                            <p:childTnLst>
+                              <p:par>
+                                <p:cTn id="5" presetID="1" presetClass="entr" presetSubtype="0" fill="hold" nodeType="clickEffect">
+                                  <p:stCondLst>
+                                    <p:cond delay="0"/>
+                                  </p:stCondLst>
+                                  <p:childTnLst>
+                                    <p:set>
+                                      <p:cBhvr>
+                                        <p:cTn id="6" dur="1" fill="hold">
+                                          <p:stCondLst>
+                                            <p:cond delay="0"/>
+                                          </p:stCondLst>
+                                        </p:cTn>
+                                        <p:tgtEl>
+                                          <p:spTgt spid="2051"/>
+                                        </p:tgtEl>
+                                        <p:attrNameLst>
+                                          <p:attrName>style.visibility</p:attrName>
+                                        </p:attrNameLst>
+                                      </p:cBhvr>
+                                      <p:to>
+                                        <p:strVal val="visible"/>
+                                      </p:to>
+                                    </p:set>
+                                  </p:childTnLst>
+                                </p:cTn>
+                              </p:par>
+                            </p:childTnLst>
+                          </p:cTn>
+                        </p:par>
+                      </p:childTnLst>
+                    </p:cTn>
+                  </p:par>
+                </p:childTnLst>
+              </p:cTn>
+              <p:prevCondLst>
+                <p:cond evt="onPrev" delay="0">
+                  <p:tgtEl>
+                    <p:sldTgt/>
+                  </p:tgtEl>
+                </p:cond>
+              </p:prevCondLst>
+              <p:nextCondLst>
+                <p:cond evt="onNext" delay="0">
+                  <p:tgtEl>
+                    <p:sldTgt/>
+                  </p:tgtEl>
+                </p:cond>
+              </p:nextCondLst>
+            </p:seq>
+          </p:childTnLst>
+        </p:cTn>
+      </p:par>
+    </p:tnLst>
+  </p:timing>
+</p:sld>
+</file>
+
+<file path=ppt/slides/slide7.xml><?xml version="1.0" encoding="utf-8"?>
+<p:sld xmlns:a="http://schemas.openxmlformats.org/drawingml/2006/main" xmlns:r="http://schemas.openxmlformats.org/officeDocument/2006/relationships" xmlns:p="http://schemas.openxmlformats.org/presentationml/2006/main">
+  <p:cSld>
+    <p:spTree>
+      <p:nvGrpSpPr>
+        <p:cNvPr id="1" name=""/>
+        <p:cNvGrpSpPr/>
+        <p:nvPr/>
+      </p:nvGrpSpPr>
+      <p:grpSpPr>
+        <a:xfrm>
+          <a:off x="0" y="0"/>
+          <a:ext cx="0" cy="0"/>
+          <a:chOff x="0" y="0"/>
+          <a:chExt cx="0" cy="0"/>
+        </a:xfrm>
+      </p:grpSpPr>
+      <p:sp>
+        <p:nvSpPr>
+          <p:cNvPr id="2" name="Textfeld 5"/>
+          <p:cNvSpPr/>
+          <p:nvPr/>
+        </p:nvSpPr>
+        <p:spPr>
+          <a:xfrm>
+            <a:off x="432000" y="792000"/>
+            <a:ext cx="8064360" cy="5256000"/>
+          </a:xfrm>
+          <a:custGeom>
+            <a:avLst/>
+            <a:gdLst>
+              <a:gd name="f0" fmla="val 0"/>
+              <a:gd name="f1" fmla="val 21600"/>
+            </a:gdLst>
+            <a:ahLst/>
+            <a:cxnLst>
+              <a:cxn ang="3cd4">
+                <a:pos x="hc" y="t"/>
+              </a:cxn>
+              <a:cxn ang="0">
+                <a:pos x="r" y="vc"/>
+              </a:cxn>
+              <a:cxn ang="cd4">
+                <a:pos x="hc" y="b"/>
+              </a:cxn>
+              <a:cxn ang="cd2">
+                <a:pos x="l" y="vc"/>
+              </a:cxn>
+            </a:cxnLst>
+            <a:rect l="l" t="t" r="r" b="b"/>
+            <a:pathLst>
+              <a:path w="21600" h="21600">
+                <a:moveTo>
+                  <a:pt x="f0" y="f0"/>
+                </a:moveTo>
+                <a:lnTo>
+                  <a:pt x="f1" y="f0"/>
+                </a:lnTo>
+                <a:lnTo>
+                  <a:pt x="f1" y="f1"/>
+                </a:lnTo>
+                <a:lnTo>
+                  <a:pt x="f0" y="f1"/>
+                </a:lnTo>
+                <a:lnTo>
+                  <a:pt x="f0" y="f0"/>
+                </a:lnTo>
+                <a:close/>
+              </a:path>
+            </a:pathLst>
+          </a:custGeom>
+          <a:noFill/>
+          <a:ln>
+            <a:noFill/>
+            <a:prstDash val="solid"/>
+          </a:ln>
+        </p:spPr>
+        <p:txBody>
+          <a:bodyPr vert="horz" wrap="square" lIns="90000" tIns="45000" rIns="90000" bIns="45000" anchor="t" anchorCtr="0" compatLnSpc="0">
+            <a:spAutoFit/>
+          </a:bodyPr>
+          <a:lstStyle>
+            <a:defPPr lvl="0">
+              <a:buSzPct val="45000"/>
+              <a:buFont typeface="StarSymbol"/>
+              <a:buNone/>
+            </a:defPPr>
+            <a:lvl1pPr lvl="0">
+              <a:buSzPct val="45000"/>
+              <a:buFont typeface="StarSymbol"/>
+              <a:buChar char="●"/>
+            </a:lvl1pPr>
+            <a:lvl2pPr lvl="1">
+              <a:buSzPct val="45000"/>
+              <a:buFont typeface="StarSymbol"/>
+              <a:buChar char="●"/>
+            </a:lvl2pPr>
+            <a:lvl3pPr lvl="2">
+              <a:buSzPct val="45000"/>
+              <a:buFont typeface="StarSymbol"/>
+              <a:buChar char="●"/>
+            </a:lvl3pPr>
+            <a:lvl4pPr lvl="3">
+              <a:buSzPct val="45000"/>
+              <a:buFont typeface="StarSymbol"/>
+              <a:buChar char="●"/>
+            </a:lvl4pPr>
+            <a:lvl5pPr lvl="4">
+              <a:buSzPct val="45000"/>
+              <a:buFont typeface="StarSymbol"/>
+              <a:buChar char="●"/>
+            </a:lvl5pPr>
+            <a:lvl6pPr lvl="5">
+              <a:buSzPct val="45000"/>
+              <a:buFont typeface="StarSymbol"/>
+              <a:buChar char="●"/>
+            </a:lvl6pPr>
+            <a:lvl7pPr lvl="6">
+              <a:buSzPct val="45000"/>
+              <a:buFont typeface="StarSymbol"/>
+              <a:buChar char="●"/>
+            </a:lvl7pPr>
+            <a:lvl8pPr lvl="7">
+              <a:buSzPct val="45000"/>
+              <a:buFont typeface="StarSymbol"/>
+              <a:buChar char="●"/>
+            </a:lvl8pPr>
+            <a:lvl9pPr lvl="8">
+              <a:buSzPct val="45000"/>
+              <a:buFont typeface="StarSymbol"/>
+              <a:buChar char="●"/>
+            </a:lvl9pPr>
+          </a:lstStyle>
+          <a:p>
+            <a:pPr marL="0" marR="0" lvl="0" indent="0" rtl="0" hangingPunct="0">
+              <a:lnSpc>
+                <a:spcPct val="100000"/>
+              </a:lnSpc>
+              <a:spcBef>
+                <a:spcPts val="0"/>
+              </a:spcBef>
+              <a:spcAft>
+                <a:spcPts val="0"/>
+              </a:spcAft>
+              <a:buNone/>
+              <a:tabLst/>
+            </a:pPr>
+            <a:endParaRPr lang="de-DE" sz="1800" b="0" i="0" u="none" strike="noStrike" kern="1200">
+              <a:ln>
+                <a:noFill/>
+              </a:ln>
+              <a:latin typeface="Arial" pitchFamily="18"/>
+              <a:ea typeface="Microsoft YaHei" pitchFamily="2"/>
+              <a:cs typeface="Mangal" pitchFamily="2"/>
+            </a:endParaRPr>
+          </a:p>
+        </p:txBody>
+      </p:sp>
+      <p:sp>
+        <p:nvSpPr>
+          <p:cNvPr id="3" name="Textfeld 6"/>
+          <p:cNvSpPr/>
+          <p:nvPr/>
+        </p:nvSpPr>
+        <p:spPr>
+          <a:xfrm>
+            <a:off x="4752000" y="216000"/>
+            <a:ext cx="4176000" cy="481755"/>
+          </a:xfrm>
+          <a:custGeom>
+            <a:avLst/>
+            <a:gdLst>
+              <a:gd name="f0" fmla="val 0"/>
+              <a:gd name="f1" fmla="val 21600"/>
+            </a:gdLst>
+            <a:ahLst/>
+            <a:cxnLst>
+              <a:cxn ang="3cd4">
+                <a:pos x="hc" y="t"/>
+              </a:cxn>
+              <a:cxn ang="0">
+                <a:pos x="r" y="vc"/>
+              </a:cxn>
+              <a:cxn ang="cd4">
+                <a:pos x="hc" y="b"/>
+              </a:cxn>
+              <a:cxn ang="cd2">
+                <a:pos x="l" y="vc"/>
+              </a:cxn>
+            </a:cxnLst>
+            <a:rect l="l" t="t" r="r" b="b"/>
+            <a:pathLst>
+              <a:path w="21600" h="21600">
+                <a:moveTo>
+                  <a:pt x="f0" y="f0"/>
+                </a:moveTo>
+                <a:lnTo>
+                  <a:pt x="f1" y="f0"/>
+                </a:lnTo>
+                <a:lnTo>
+                  <a:pt x="f1" y="f1"/>
+                </a:lnTo>
+                <a:lnTo>
+                  <a:pt x="f0" y="f1"/>
+                </a:lnTo>
+                <a:lnTo>
+                  <a:pt x="f0" y="f0"/>
+                </a:lnTo>
+                <a:close/>
+              </a:path>
+            </a:pathLst>
+          </a:custGeom>
+          <a:noFill/>
+          <a:ln>
+            <a:noFill/>
+            <a:prstDash val="solid"/>
+          </a:ln>
+        </p:spPr>
+        <p:txBody>
+          <a:bodyPr vert="horz" wrap="square" lIns="90000" tIns="45000" rIns="90000" bIns="45000" anchor="t" anchorCtr="0" compatLnSpc="0">
+            <a:spAutoFit/>
+          </a:bodyPr>
+          <a:lstStyle>
+            <a:defPPr lvl="0">
+              <a:buSzPct val="45000"/>
+              <a:buFont typeface="StarSymbol"/>
+              <a:buNone/>
+            </a:defPPr>
+            <a:lvl1pPr lvl="0">
+              <a:buSzPct val="45000"/>
+              <a:buFont typeface="StarSymbol"/>
+              <a:buChar char="●"/>
+            </a:lvl1pPr>
+            <a:lvl2pPr lvl="1">
+              <a:buSzPct val="45000"/>
+              <a:buFont typeface="StarSymbol"/>
+              <a:buChar char="●"/>
+            </a:lvl2pPr>
+            <a:lvl3pPr lvl="2">
+              <a:buSzPct val="45000"/>
+              <a:buFont typeface="StarSymbol"/>
+              <a:buChar char="●"/>
+            </a:lvl3pPr>
+            <a:lvl4pPr lvl="3">
+              <a:buSzPct val="45000"/>
+              <a:buFont typeface="StarSymbol"/>
+              <a:buChar char="●"/>
+            </a:lvl4pPr>
+            <a:lvl5pPr lvl="4">
+              <a:buSzPct val="45000"/>
+              <a:buFont typeface="StarSymbol"/>
+              <a:buChar char="●"/>
+            </a:lvl5pPr>
+            <a:lvl6pPr lvl="5">
+              <a:buSzPct val="45000"/>
+              <a:buFont typeface="StarSymbol"/>
+              <a:buChar char="●"/>
+            </a:lvl6pPr>
+            <a:lvl7pPr lvl="6">
+              <a:buSzPct val="45000"/>
+              <a:buFont typeface="StarSymbol"/>
+              <a:buChar char="●"/>
+            </a:lvl7pPr>
+            <a:lvl8pPr lvl="7">
+              <a:buSzPct val="45000"/>
+              <a:buFont typeface="StarSymbol"/>
+              <a:buChar char="●"/>
+            </a:lvl8pPr>
+            <a:lvl9pPr lvl="8">
+              <a:buSzPct val="45000"/>
+              <a:buFont typeface="StarSymbol"/>
+              <a:buChar char="●"/>
+            </a:lvl9pPr>
+          </a:lstStyle>
+          <a:p>
+            <a:pPr marL="0" marR="0" lvl="0" indent="0" algn="r" rtl="0" hangingPunct="1">
+              <a:lnSpc>
+                <a:spcPct val="100000"/>
+              </a:lnSpc>
+              <a:spcBef>
+                <a:spcPts val="0"/>
+              </a:spcBef>
+              <a:spcAft>
+                <a:spcPts val="0"/>
+              </a:spcAft>
+              <a:buNone/>
+              <a:tabLst/>
+              <a:defRPr sz="2600">
+                <a:latin typeface="Cambria" pitchFamily="18"/>
+              </a:defRPr>
+            </a:pPr>
+            <a:r>
+              <a:rPr lang="de-DE" sz="2600" b="0" i="0" u="none" strike="noStrike" kern="1200" spc="0" dirty="0" err="1" smtClean="0">
+                <a:ln>
+                  <a:noFill/>
+                </a:ln>
+                <a:solidFill>
+                  <a:srgbClr val="000000"/>
+                </a:solidFill>
+                <a:latin typeface="Cambria" pitchFamily="18"/>
+                <a:ea typeface="Microsoft YaHei" pitchFamily="2"/>
+                <a:cs typeface="Mangal" pitchFamily="2"/>
+              </a:rPr>
+              <a:t>Explorative</a:t>
+            </a:r>
+            <a:r>
+              <a:rPr lang="de-DE" sz="2600" b="0" i="0" u="none" strike="noStrike" kern="1200" spc="0" dirty="0" smtClean="0">
+                <a:ln>
+                  <a:noFill/>
+                </a:ln>
+                <a:solidFill>
+                  <a:srgbClr val="000000"/>
+                </a:solidFill>
+                <a:latin typeface="Cambria" pitchFamily="18"/>
+                <a:ea typeface="Microsoft YaHei" pitchFamily="2"/>
+                <a:cs typeface="Mangal" pitchFamily="2"/>
+              </a:rPr>
+              <a:t> </a:t>
+            </a:r>
+            <a:r>
+              <a:rPr lang="de-DE" sz="2600" b="0" i="0" u="none" strike="noStrike" kern="1200" spc="0" dirty="0">
+                <a:ln>
+                  <a:noFill/>
+                </a:ln>
+                <a:solidFill>
+                  <a:srgbClr val="000000"/>
+                </a:solidFill>
+                <a:latin typeface="Cambria" pitchFamily="18"/>
+                <a:ea typeface="Microsoft YaHei" pitchFamily="2"/>
+                <a:cs typeface="Mangal" pitchFamily="2"/>
+              </a:rPr>
+              <a:t>Data Analysis</a:t>
+            </a:r>
+          </a:p>
+        </p:txBody>
+      </p:sp>
+      <p:sp>
+        <p:nvSpPr>
+          <p:cNvPr id="4" name="Textfeld 3"/>
+          <p:cNvSpPr txBox="1"/>
+          <p:nvPr/>
+        </p:nvSpPr>
+        <p:spPr>
+          <a:xfrm>
+            <a:off x="72000" y="6408000"/>
+            <a:ext cx="3888000" cy="358560"/>
+          </a:xfrm>
+          <a:prstGeom prst="rect">
+            <a:avLst/>
+          </a:prstGeom>
+          <a:noFill/>
+          <a:ln>
+            <a:noFill/>
+          </a:ln>
+        </p:spPr>
+        <p:txBody>
+          <a:bodyPr vert="horz" wrap="none" lIns="90000" tIns="45000" rIns="90000" bIns="45000" anchorCtr="0" compatLnSpc="0">
+            <a:spAutoFit/>
+          </a:bodyPr>
+          <a:lstStyle>
+            <a:defPPr lvl="0">
+              <a:buSzPct val="45000"/>
+              <a:buFont typeface="StarSymbol"/>
+              <a:buNone/>
+            </a:defPPr>
+            <a:lvl1pPr lvl="0">
+              <a:buSzPct val="45000"/>
+              <a:buFont typeface="StarSymbol"/>
+              <a:buChar char="●"/>
+            </a:lvl1pPr>
+            <a:lvl2pPr lvl="1">
+              <a:buSzPct val="45000"/>
+              <a:buFont typeface="StarSymbol"/>
+              <a:buChar char="●"/>
+            </a:lvl2pPr>
+            <a:lvl3pPr lvl="2">
+              <a:buSzPct val="45000"/>
+              <a:buFont typeface="StarSymbol"/>
+              <a:buChar char="●"/>
+            </a:lvl3pPr>
+            <a:lvl4pPr lvl="3">
+              <a:buSzPct val="45000"/>
+              <a:buFont typeface="StarSymbol"/>
+              <a:buChar char="●"/>
+            </a:lvl4pPr>
+            <a:lvl5pPr lvl="4">
+              <a:buSzPct val="45000"/>
+              <a:buFont typeface="StarSymbol"/>
+              <a:buChar char="●"/>
+            </a:lvl5pPr>
+            <a:lvl6pPr lvl="5">
+              <a:buSzPct val="45000"/>
+              <a:buFont typeface="StarSymbol"/>
+              <a:buChar char="●"/>
+            </a:lvl6pPr>
+            <a:lvl7pPr lvl="6">
+              <a:buSzPct val="45000"/>
+              <a:buFont typeface="StarSymbol"/>
+              <a:buChar char="●"/>
+            </a:lvl7pPr>
+            <a:lvl8pPr lvl="7">
+              <a:buSzPct val="45000"/>
+              <a:buFont typeface="StarSymbol"/>
+              <a:buChar char="●"/>
+            </a:lvl8pPr>
+            <a:lvl9pPr lvl="8">
+              <a:buSzPct val="45000"/>
+              <a:buFont typeface="StarSymbol"/>
+              <a:buChar char="●"/>
+            </a:lvl9pPr>
+          </a:lstStyle>
+          <a:p>
+            <a:pPr marL="0" marR="0" lvl="0" indent="0" rtl="0" hangingPunct="0">
+              <a:lnSpc>
+                <a:spcPct val="100000"/>
+              </a:lnSpc>
+              <a:spcBef>
+                <a:spcPts val="0"/>
+              </a:spcBef>
+              <a:spcAft>
+                <a:spcPts val="0"/>
+              </a:spcAft>
+              <a:buNone/>
+              <a:tabLst/>
+              <a:defRPr>
+                <a:latin typeface="Cambria" pitchFamily="18"/>
+              </a:defRPr>
+            </a:pPr>
+            <a:r>
+              <a:rPr lang="de-DE" sz="1800" b="0" i="0" u="none" strike="noStrike" kern="1200">
+                <a:ln>
+                  <a:noFill/>
+                </a:ln>
+                <a:latin typeface="Cambria" pitchFamily="18"/>
+                <a:ea typeface="Microsoft YaHei" pitchFamily="2"/>
+                <a:cs typeface="Mangal" pitchFamily="2"/>
+              </a:rPr>
+              <a:t>Project Samael</a:t>
+            </a:r>
+          </a:p>
+        </p:txBody>
+      </p:sp>
+      <p:pic>
+        <p:nvPicPr>
+          <p:cNvPr id="6" name="Picture 2" descr="E:\pro\img-classification-ss13\doc\PPT-2013-05-22\graph-pipeline.png"/>
+          <p:cNvPicPr>
+            <a:picLocks noChangeAspect="1" noChangeArrowheads="1"/>
+          </p:cNvPicPr>
+          <p:nvPr/>
+        </p:nvPicPr>
+        <p:blipFill>
+          <a:blip r:embed="rId3">
+            <a:extLst>
+              <a:ext uri="{28A0092B-C50C-407E-A947-70E740481C1C}">
+                <a14:useLocalDpi xmlns:a14="http://schemas.microsoft.com/office/drawing/2010/main" val="0"/>
+              </a:ext>
+            </a:extLst>
+          </a:blip>
+          <a:srcRect/>
+          <a:stretch>
+            <a:fillRect/>
+          </a:stretch>
+        </p:blipFill>
+        <p:spPr bwMode="auto">
+          <a:xfrm>
+            <a:off x="-610346" y="-4563888"/>
+            <a:ext cx="4534274" cy="10375913"/>
+          </a:xfrm>
+          <a:prstGeom prst="rect">
+            <a:avLst/>
+          </a:prstGeom>
+          <a:noFill/>
+          <a:extLst>
+            <a:ext uri="{909E8E84-426E-40DD-AFC4-6F175D3DCCD1}">
+              <a14:hiddenFill xmlns:a14="http://schemas.microsoft.com/office/drawing/2010/main">
+                <a:solidFill>
+                  <a:srgbClr val="FFFFFF"/>
+                </a:solidFill>
+              </a14:hiddenFill>
+            </a:ext>
+          </a:extLst>
+        </p:spPr>
+      </p:pic>
+    </p:spTree>
+    <p:extLst>
+      <p:ext uri="{BB962C8B-B14F-4D97-AF65-F5344CB8AC3E}">
+        <p14:creationId xmlns:p14="http://schemas.microsoft.com/office/powerpoint/2010/main" val="4206361043"/>
+      </p:ext>
+    </p:extLst>
+  </p:cSld>
+  <p:clrMapOvr>
+    <a:masterClrMapping/>
+  </p:clrMapOvr>
+  <p:transition/>
+  <p:timing>
+    <p:tnLst>
+      <p:par>
+        <p:cTn id="1" dur="indefinite" restart="never" nodeType="tmRoot"/>
+      </p:par>
+    </p:tnLst>
+  </p:timing>
+</p:sld>
+</file>
+
+<file path=ppt/slides/slide8.xml><?xml version="1.0" encoding="utf-8"?>
 <p:sld xmlns:a="http://schemas.openxmlformats.org/drawingml/2006/main" xmlns:r="http://schemas.openxmlformats.org/officeDocument/2006/relationships" xmlns:p="http://schemas.openxmlformats.org/presentationml/2006/main">
   <p:cSld name="page7">
     <p:spTree>

</xml_diff>